<commit_message>
add timer.html form group
</commit_message>
<xml_diff>
--- a/doc/愛心便當收銀系統.pptx
+++ b/doc/愛心便當收銀系統.pptx
@@ -6,16 +6,18 @@
   </p:sldMasterIdLst>
   <p:sldIdLst>
     <p:sldId id="256" r:id="rId2"/>
-    <p:sldId id="257" r:id="rId3"/>
-    <p:sldId id="266" r:id="rId4"/>
-    <p:sldId id="265" r:id="rId5"/>
-    <p:sldId id="258" r:id="rId6"/>
-    <p:sldId id="259" r:id="rId7"/>
-    <p:sldId id="260" r:id="rId8"/>
-    <p:sldId id="261" r:id="rId9"/>
-    <p:sldId id="262" r:id="rId10"/>
-    <p:sldId id="263" r:id="rId11"/>
-    <p:sldId id="264" r:id="rId12"/>
+    <p:sldId id="267" r:id="rId3"/>
+    <p:sldId id="268" r:id="rId4"/>
+    <p:sldId id="257" r:id="rId5"/>
+    <p:sldId id="266" r:id="rId6"/>
+    <p:sldId id="265" r:id="rId7"/>
+    <p:sldId id="258" r:id="rId8"/>
+    <p:sldId id="259" r:id="rId9"/>
+    <p:sldId id="260" r:id="rId10"/>
+    <p:sldId id="261" r:id="rId11"/>
+    <p:sldId id="262" r:id="rId12"/>
+    <p:sldId id="263" r:id="rId13"/>
+    <p:sldId id="264" r:id="rId14"/>
   </p:sldIdLst>
   <p:sldSz cx="9144000" cy="6858000" type="screen4x3"/>
   <p:notesSz cx="6858000" cy="9144000"/>
@@ -3779,7 +3781,15 @@
             <a:pPr algn="ctr"/>
             <a:r>
               <a:rPr lang="zh-TW" altLang="en-US" sz="4000" b="1" dirty="0" smtClean="0"/>
-              <a:t>－ 前後台展示</a:t>
+              <a:t>－ </a:t>
+            </a:r>
+            <a:r>
+              <a:rPr lang="zh-TW" altLang="en-US" sz="4000" b="1" dirty="0" smtClean="0"/>
+              <a:t>後</a:t>
+            </a:r>
+            <a:r>
+              <a:rPr lang="zh-TW" altLang="en-US" sz="4000" b="1" dirty="0" smtClean="0"/>
+              <a:t>台展示</a:t>
             </a:r>
             <a:endParaRPr lang="zh-TW" altLang="en-US" sz="4000" b="1" dirty="0"/>
           </a:p>
@@ -3933,7 +3943,229 @@
             </a:r>
             <a:r>
               <a:rPr lang="zh-TW" altLang="en-US" sz="4000" b="1" dirty="0"/>
-              <a:t> 時段</a:t>
+              <a:t> </a:t>
+            </a:r>
+            <a:r>
+              <a:rPr lang="zh-TW" altLang="en-US" sz="4000" b="1" dirty="0" smtClean="0"/>
+              <a:t>兌換紀錄</a:t>
+            </a:r>
+            <a:endParaRPr lang="zh-TW" altLang="en-US" sz="4000" b="1" dirty="0"/>
+          </a:p>
+        </p:txBody>
+      </p:sp>
+      <p:pic>
+        <p:nvPicPr>
+          <p:cNvPr id="5122" name="Picture 2"/>
+          <p:cNvPicPr>
+            <a:picLocks noChangeAspect="1" noChangeArrowheads="1"/>
+          </p:cNvPicPr>
+          <p:nvPr/>
+        </p:nvPicPr>
+        <p:blipFill>
+          <a:blip r:embed="rId2">
+            <a:extLst>
+              <a:ext uri="{28A0092B-C50C-407E-A947-70E740481C1C}">
+                <a14:useLocalDpi xmlns:a14="http://schemas.microsoft.com/office/drawing/2010/main" val="0"/>
+              </a:ext>
+            </a:extLst>
+          </a:blip>
+          <a:srcRect/>
+          <a:stretch>
+            <a:fillRect/>
+          </a:stretch>
+        </p:blipFill>
+        <p:spPr bwMode="auto">
+          <a:xfrm>
+            <a:off x="251519" y="2132856"/>
+            <a:ext cx="8598371" cy="3734016"/>
+          </a:xfrm>
+          <a:prstGeom prst="rect">
+            <a:avLst/>
+          </a:prstGeom>
+          <a:noFill/>
+          <a:ln>
+            <a:noFill/>
+          </a:ln>
+          <a:effectLst/>
+          <a:extLst>
+            <a:ext uri="{909E8E84-426E-40DD-AFC4-6F175D3DCCD1}">
+              <a14:hiddenFill xmlns:a14="http://schemas.microsoft.com/office/drawing/2010/main">
+                <a:solidFill>
+                  <a:schemeClr val="accent1"/>
+                </a:solidFill>
+              </a14:hiddenFill>
+            </a:ext>
+            <a:ext uri="{91240B29-F687-4F45-9708-019B960494DF}">
+              <a14:hiddenLine xmlns:a14="http://schemas.microsoft.com/office/drawing/2010/main" w="9525">
+                <a:solidFill>
+                  <a:schemeClr val="tx1"/>
+                </a:solidFill>
+                <a:miter lim="800000"/>
+                <a:headEnd/>
+                <a:tailEnd/>
+              </a14:hiddenLine>
+            </a:ext>
+            <a:ext uri="{AF507438-7753-43E0-B8FC-AC1667EBCBE1}">
+              <a14:hiddenEffects xmlns:a14="http://schemas.microsoft.com/office/drawing/2010/main">
+                <a:effectLst>
+                  <a:outerShdw dist="35921" dir="2700000" algn="ctr" rotWithShape="0">
+                    <a:schemeClr val="bg2"/>
+                  </a:outerShdw>
+                </a:effectLst>
+              </a14:hiddenEffects>
+            </a:ext>
+          </a:extLst>
+        </p:spPr>
+      </p:pic>
+    </p:spTree>
+    <p:extLst>
+      <p:ext uri="{BB962C8B-B14F-4D97-AF65-F5344CB8AC3E}">
+        <p14:creationId xmlns:p14="http://schemas.microsoft.com/office/powerpoint/2010/main" val="4261227779"/>
+      </p:ext>
+    </p:extLst>
+  </p:cSld>
+  <p:clrMapOvr>
+    <a:masterClrMapping/>
+  </p:clrMapOvr>
+  <p:timing>
+    <p:tnLst>
+      <p:par>
+        <p:cTn id="1" dur="indefinite" restart="never" nodeType="tmRoot"/>
+      </p:par>
+    </p:tnLst>
+  </p:timing>
+</p:sld>
+</file>
+
+<file path=ppt/slides/slide11.xml><?xml version="1.0" encoding="utf-8"?>
+<p:sld xmlns:a="http://schemas.openxmlformats.org/drawingml/2006/main" xmlns:r="http://schemas.openxmlformats.org/officeDocument/2006/relationships" xmlns:p="http://schemas.openxmlformats.org/presentationml/2006/main">
+  <p:cSld>
+    <p:spTree>
+      <p:nvGrpSpPr>
+        <p:cNvPr id="1" name=""/>
+        <p:cNvGrpSpPr/>
+        <p:nvPr/>
+      </p:nvGrpSpPr>
+      <p:grpSpPr>
+        <a:xfrm>
+          <a:off x="0" y="0"/>
+          <a:ext cx="0" cy="0"/>
+          <a:chOff x="0" y="0"/>
+          <a:chExt cx="0" cy="0"/>
+        </a:xfrm>
+      </p:grpSpPr>
+      <p:sp>
+        <p:nvSpPr>
+          <p:cNvPr id="4" name="標題 1"/>
+          <p:cNvSpPr txBox="1">
+            <a:spLocks/>
+          </p:cNvSpPr>
+          <p:nvPr/>
+        </p:nvSpPr>
+        <p:spPr>
+          <a:xfrm>
+            <a:off x="914211" y="764704"/>
+            <a:ext cx="7543800" cy="720080"/>
+          </a:xfrm>
+          <a:prstGeom prst="rect">
+            <a:avLst/>
+          </a:prstGeom>
+        </p:spPr>
+        <p:txBody>
+          <a:bodyPr vert="horz" lIns="91440" tIns="45720" rIns="91440" bIns="45720" rtlCol="0" anchor="b">
+            <a:noAutofit/>
+          </a:bodyPr>
+          <a:lstStyle>
+            <a:lvl1pPr algn="l" defTabSz="914400" rtl="0" eaLnBrk="1" latinLnBrk="0" hangingPunct="1">
+              <a:spcBef>
+                <a:spcPct val="0"/>
+              </a:spcBef>
+              <a:buNone/>
+              <a:defRPr sz="6000" kern="1200">
+                <a:solidFill>
+                  <a:schemeClr val="tx1"/>
+                </a:solidFill>
+                <a:effectLst>
+                  <a:outerShdw blurRad="38100" dist="38100" dir="2700000" algn="tl">
+                    <a:srgbClr val="000000">
+                      <a:alpha val="43137"/>
+                    </a:srgbClr>
+                  </a:outerShdw>
+                </a:effectLst>
+                <a:latin typeface="+mj-lt"/>
+                <a:ea typeface="+mj-ea"/>
+                <a:cs typeface="+mj-cs"/>
+              </a:defRPr>
+            </a:lvl1pPr>
+            <a:lvl2pPr eaLnBrk="1" hangingPunct="1">
+              <a:defRPr>
+                <a:solidFill>
+                  <a:schemeClr val="tx2"/>
+                </a:solidFill>
+              </a:defRPr>
+            </a:lvl2pPr>
+            <a:lvl3pPr eaLnBrk="1" hangingPunct="1">
+              <a:defRPr>
+                <a:solidFill>
+                  <a:schemeClr val="tx2"/>
+                </a:solidFill>
+              </a:defRPr>
+            </a:lvl3pPr>
+            <a:lvl4pPr eaLnBrk="1" hangingPunct="1">
+              <a:defRPr>
+                <a:solidFill>
+                  <a:schemeClr val="tx2"/>
+                </a:solidFill>
+              </a:defRPr>
+            </a:lvl4pPr>
+            <a:lvl5pPr eaLnBrk="1" hangingPunct="1">
+              <a:defRPr>
+                <a:solidFill>
+                  <a:schemeClr val="tx2"/>
+                </a:solidFill>
+              </a:defRPr>
+            </a:lvl5pPr>
+            <a:lvl6pPr eaLnBrk="1" hangingPunct="1">
+              <a:defRPr>
+                <a:solidFill>
+                  <a:schemeClr val="tx2"/>
+                </a:solidFill>
+              </a:defRPr>
+            </a:lvl6pPr>
+            <a:lvl7pPr eaLnBrk="1" hangingPunct="1">
+              <a:defRPr>
+                <a:solidFill>
+                  <a:schemeClr val="tx2"/>
+                </a:solidFill>
+              </a:defRPr>
+            </a:lvl7pPr>
+            <a:lvl8pPr eaLnBrk="1" hangingPunct="1">
+              <a:defRPr>
+                <a:solidFill>
+                  <a:schemeClr val="tx2"/>
+                </a:solidFill>
+              </a:defRPr>
+            </a:lvl8pPr>
+            <a:lvl9pPr eaLnBrk="1" hangingPunct="1">
+              <a:defRPr>
+                <a:solidFill>
+                  <a:schemeClr val="tx2"/>
+                </a:solidFill>
+              </a:defRPr>
+            </a:lvl9pPr>
+          </a:lstStyle>
+          <a:p>
+            <a:r>
+              <a:rPr lang="zh-TW" altLang="en-US" sz="4000" b="1" dirty="0" smtClean="0"/>
+              <a:t>首頁 </a:t>
+            </a:r>
+            <a:r>
+              <a:rPr lang="en-US" altLang="zh-TW" sz="4000" b="1" dirty="0"/>
+              <a:t>/</a:t>
+            </a:r>
+            <a:r>
+              <a:rPr lang="zh-TW" altLang="en-US" sz="4000" b="1" dirty="0"/>
+              <a:t> 系統帳號</a:t>
             </a:r>
             <a:r>
               <a:rPr lang="zh-TW" altLang="en-US" sz="4000" b="1" dirty="0" smtClean="0"/>
@@ -3943,6 +4175,292 @@
           </a:p>
         </p:txBody>
       </p:sp>
+      <p:pic>
+        <p:nvPicPr>
+          <p:cNvPr id="6146" name="Picture 2"/>
+          <p:cNvPicPr>
+            <a:picLocks noChangeAspect="1" noChangeArrowheads="1"/>
+          </p:cNvPicPr>
+          <p:nvPr/>
+        </p:nvPicPr>
+        <p:blipFill>
+          <a:blip r:embed="rId2">
+            <a:extLst>
+              <a:ext uri="{28A0092B-C50C-407E-A947-70E740481C1C}">
+                <a14:useLocalDpi xmlns:a14="http://schemas.microsoft.com/office/drawing/2010/main" val="0"/>
+              </a:ext>
+            </a:extLst>
+          </a:blip>
+          <a:srcRect/>
+          <a:stretch>
+            <a:fillRect/>
+          </a:stretch>
+        </p:blipFill>
+        <p:spPr bwMode="auto">
+          <a:xfrm>
+            <a:off x="209325" y="2276872"/>
+            <a:ext cx="8758833" cy="3826520"/>
+          </a:xfrm>
+          <a:prstGeom prst="rect">
+            <a:avLst/>
+          </a:prstGeom>
+          <a:noFill/>
+          <a:ln>
+            <a:noFill/>
+          </a:ln>
+          <a:effectLst/>
+          <a:extLst>
+            <a:ext uri="{909E8E84-426E-40DD-AFC4-6F175D3DCCD1}">
+              <a14:hiddenFill xmlns:a14="http://schemas.microsoft.com/office/drawing/2010/main">
+                <a:solidFill>
+                  <a:schemeClr val="accent1"/>
+                </a:solidFill>
+              </a14:hiddenFill>
+            </a:ext>
+            <a:ext uri="{91240B29-F687-4F45-9708-019B960494DF}">
+              <a14:hiddenLine xmlns:a14="http://schemas.microsoft.com/office/drawing/2010/main" w="9525">
+                <a:solidFill>
+                  <a:schemeClr val="tx1"/>
+                </a:solidFill>
+                <a:miter lim="800000"/>
+                <a:headEnd/>
+                <a:tailEnd/>
+              </a14:hiddenLine>
+            </a:ext>
+            <a:ext uri="{AF507438-7753-43E0-B8FC-AC1667EBCBE1}">
+              <a14:hiddenEffects xmlns:a14="http://schemas.microsoft.com/office/drawing/2010/main">
+                <a:effectLst>
+                  <a:outerShdw dist="35921" dir="2700000" algn="ctr" rotWithShape="0">
+                    <a:schemeClr val="bg2"/>
+                  </a:outerShdw>
+                </a:effectLst>
+              </a14:hiddenEffects>
+            </a:ext>
+          </a:extLst>
+        </p:spPr>
+      </p:pic>
+    </p:spTree>
+    <p:extLst>
+      <p:ext uri="{BB962C8B-B14F-4D97-AF65-F5344CB8AC3E}">
+        <p14:creationId xmlns:p14="http://schemas.microsoft.com/office/powerpoint/2010/main" val="969067509"/>
+      </p:ext>
+    </p:extLst>
+  </p:cSld>
+  <p:clrMapOvr>
+    <a:masterClrMapping/>
+  </p:clrMapOvr>
+  <p:timing>
+    <p:tnLst>
+      <p:par>
+        <p:cTn id="1" dur="indefinite" restart="never" nodeType="tmRoot"/>
+      </p:par>
+    </p:tnLst>
+  </p:timing>
+</p:sld>
+</file>
+
+<file path=ppt/slides/slide12.xml><?xml version="1.0" encoding="utf-8"?>
+<p:sld xmlns:a="http://schemas.openxmlformats.org/drawingml/2006/main" xmlns:r="http://schemas.openxmlformats.org/officeDocument/2006/relationships" xmlns:p="http://schemas.openxmlformats.org/presentationml/2006/main">
+  <p:cSld>
+    <p:spTree>
+      <p:nvGrpSpPr>
+        <p:cNvPr id="1" name=""/>
+        <p:cNvGrpSpPr/>
+        <p:nvPr/>
+      </p:nvGrpSpPr>
+      <p:grpSpPr>
+        <a:xfrm>
+          <a:off x="0" y="0"/>
+          <a:ext cx="0" cy="0"/>
+          <a:chOff x="0" y="0"/>
+          <a:chExt cx="0" cy="0"/>
+        </a:xfrm>
+      </p:grpSpPr>
+      <p:sp>
+        <p:nvSpPr>
+          <p:cNvPr id="4" name="標題 1"/>
+          <p:cNvSpPr txBox="1">
+            <a:spLocks/>
+          </p:cNvSpPr>
+          <p:nvPr/>
+        </p:nvSpPr>
+        <p:spPr>
+          <a:xfrm>
+            <a:off x="914211" y="764704"/>
+            <a:ext cx="7543800" cy="720080"/>
+          </a:xfrm>
+          <a:prstGeom prst="rect">
+            <a:avLst/>
+          </a:prstGeom>
+        </p:spPr>
+        <p:txBody>
+          <a:bodyPr vert="horz" lIns="91440" tIns="45720" rIns="91440" bIns="45720" rtlCol="0" anchor="b">
+            <a:noAutofit/>
+          </a:bodyPr>
+          <a:lstStyle>
+            <a:lvl1pPr algn="l" defTabSz="914400" rtl="0" eaLnBrk="1" latinLnBrk="0" hangingPunct="1">
+              <a:spcBef>
+                <a:spcPct val="0"/>
+              </a:spcBef>
+              <a:buNone/>
+              <a:defRPr sz="6000" kern="1200">
+                <a:solidFill>
+                  <a:schemeClr val="tx1"/>
+                </a:solidFill>
+                <a:effectLst>
+                  <a:outerShdw blurRad="38100" dist="38100" dir="2700000" algn="tl">
+                    <a:srgbClr val="000000">
+                      <a:alpha val="43137"/>
+                    </a:srgbClr>
+                  </a:outerShdw>
+                </a:effectLst>
+                <a:latin typeface="+mj-lt"/>
+                <a:ea typeface="+mj-ea"/>
+                <a:cs typeface="+mj-cs"/>
+              </a:defRPr>
+            </a:lvl1pPr>
+            <a:lvl2pPr eaLnBrk="1" hangingPunct="1">
+              <a:defRPr>
+                <a:solidFill>
+                  <a:schemeClr val="tx2"/>
+                </a:solidFill>
+              </a:defRPr>
+            </a:lvl2pPr>
+            <a:lvl3pPr eaLnBrk="1" hangingPunct="1">
+              <a:defRPr>
+                <a:solidFill>
+                  <a:schemeClr val="tx2"/>
+                </a:solidFill>
+              </a:defRPr>
+            </a:lvl3pPr>
+            <a:lvl4pPr eaLnBrk="1" hangingPunct="1">
+              <a:defRPr>
+                <a:solidFill>
+                  <a:schemeClr val="tx2"/>
+                </a:solidFill>
+              </a:defRPr>
+            </a:lvl4pPr>
+            <a:lvl5pPr eaLnBrk="1" hangingPunct="1">
+              <a:defRPr>
+                <a:solidFill>
+                  <a:schemeClr val="tx2"/>
+                </a:solidFill>
+              </a:defRPr>
+            </a:lvl5pPr>
+            <a:lvl6pPr eaLnBrk="1" hangingPunct="1">
+              <a:defRPr>
+                <a:solidFill>
+                  <a:schemeClr val="tx2"/>
+                </a:solidFill>
+              </a:defRPr>
+            </a:lvl6pPr>
+            <a:lvl7pPr eaLnBrk="1" hangingPunct="1">
+              <a:defRPr>
+                <a:solidFill>
+                  <a:schemeClr val="tx2"/>
+                </a:solidFill>
+              </a:defRPr>
+            </a:lvl7pPr>
+            <a:lvl8pPr eaLnBrk="1" hangingPunct="1">
+              <a:defRPr>
+                <a:solidFill>
+                  <a:schemeClr val="tx2"/>
+                </a:solidFill>
+              </a:defRPr>
+            </a:lvl8pPr>
+            <a:lvl9pPr eaLnBrk="1" hangingPunct="1">
+              <a:defRPr>
+                <a:solidFill>
+                  <a:schemeClr val="tx2"/>
+                </a:solidFill>
+              </a:defRPr>
+            </a:lvl9pPr>
+          </a:lstStyle>
+          <a:p>
+            <a:r>
+              <a:rPr lang="zh-TW" altLang="en-US" sz="4000" b="1" dirty="0" smtClean="0"/>
+              <a:t>首頁 </a:t>
+            </a:r>
+            <a:r>
+              <a:rPr lang="en-US" altLang="zh-TW" sz="4000" b="1" dirty="0"/>
+              <a:t>/</a:t>
+            </a:r>
+            <a:r>
+              <a:rPr lang="zh-TW" altLang="en-US" sz="4000" b="1" dirty="0"/>
+              <a:t> 時段</a:t>
+            </a:r>
+            <a:r>
+              <a:rPr lang="zh-TW" altLang="en-US" sz="4000" b="1" dirty="0" smtClean="0"/>
+              <a:t>管理</a:t>
+            </a:r>
+            <a:endParaRPr lang="zh-TW" altLang="en-US" sz="4000" b="1" dirty="0"/>
+          </a:p>
+        </p:txBody>
+      </p:sp>
+      <p:pic>
+        <p:nvPicPr>
+          <p:cNvPr id="3074" name="Picture 2"/>
+          <p:cNvPicPr>
+            <a:picLocks noChangeAspect="1" noChangeArrowheads="1"/>
+          </p:cNvPicPr>
+          <p:nvPr/>
+        </p:nvPicPr>
+        <p:blipFill>
+          <a:blip r:embed="rId2">
+            <a:extLst>
+              <a:ext uri="{28A0092B-C50C-407E-A947-70E740481C1C}">
+                <a14:useLocalDpi xmlns:a14="http://schemas.microsoft.com/office/drawing/2010/main" val="0"/>
+              </a:ext>
+            </a:extLst>
+          </a:blip>
+          <a:srcRect/>
+          <a:stretch>
+            <a:fillRect/>
+          </a:stretch>
+        </p:blipFill>
+        <p:spPr bwMode="auto">
+          <a:xfrm>
+            <a:off x="1600200" y="2302732"/>
+            <a:ext cx="5943600" cy="2219325"/>
+          </a:xfrm>
+          <a:prstGeom prst="rect">
+            <a:avLst/>
+          </a:prstGeom>
+          <a:noFill/>
+          <a:ln>
+            <a:noFill/>
+          </a:ln>
+          <a:effectLst/>
+          <a:extLst>
+            <a:ext uri="{909E8E84-426E-40DD-AFC4-6F175D3DCCD1}">
+              <a14:hiddenFill xmlns:a14="http://schemas.microsoft.com/office/drawing/2010/main">
+                <a:solidFill>
+                  <a:schemeClr val="accent1"/>
+                </a:solidFill>
+              </a14:hiddenFill>
+            </a:ext>
+            <a:ext uri="{91240B29-F687-4F45-9708-019B960494DF}">
+              <a14:hiddenLine xmlns:a14="http://schemas.microsoft.com/office/drawing/2010/main" w="9525">
+                <a:solidFill>
+                  <a:schemeClr val="tx1"/>
+                </a:solidFill>
+                <a:miter lim="800000"/>
+                <a:headEnd/>
+                <a:tailEnd/>
+              </a14:hiddenLine>
+            </a:ext>
+            <a:ext uri="{AF507438-7753-43E0-B8FC-AC1667EBCBE1}">
+              <a14:hiddenEffects xmlns:a14="http://schemas.microsoft.com/office/drawing/2010/main">
+                <a:effectLst>
+                  <a:outerShdw dist="35921" dir="2700000" algn="ctr" rotWithShape="0">
+                    <a:schemeClr val="bg2"/>
+                  </a:outerShdw>
+                </a:effectLst>
+              </a14:hiddenEffects>
+            </a:ext>
+          </a:extLst>
+        </p:spPr>
+      </p:pic>
     </p:spTree>
     <p:extLst>
       <p:ext uri="{BB962C8B-B14F-4D97-AF65-F5344CB8AC3E}">
@@ -3963,7 +4481,7 @@
 </p:sld>
 </file>
 
-<file path=ppt/slides/slide11.xml><?xml version="1.0" encoding="utf-8"?>
+<file path=ppt/slides/slide13.xml><?xml version="1.0" encoding="utf-8"?>
 <p:sld xmlns:a="http://schemas.openxmlformats.org/drawingml/2006/main" xmlns:r="http://schemas.openxmlformats.org/officeDocument/2006/relationships" xmlns:p="http://schemas.openxmlformats.org/presentationml/2006/main">
   <p:cSld>
     <p:spTree>
@@ -4305,6 +4823,877 @@
           <a:p>
             <a:r>
               <a:rPr lang="zh-TW" altLang="en-US" sz="4000" b="1" dirty="0" smtClean="0"/>
+              <a:t>後台系統架構</a:t>
+            </a:r>
+            <a:endParaRPr lang="zh-TW" altLang="en-US" sz="4000" b="1" dirty="0"/>
+          </a:p>
+        </p:txBody>
+      </p:sp>
+      <p:sp>
+        <p:nvSpPr>
+          <p:cNvPr id="2" name="矩形 1"/>
+          <p:cNvSpPr/>
+          <p:nvPr/>
+        </p:nvSpPr>
+        <p:spPr>
+          <a:xfrm>
+            <a:off x="5148064" y="1340768"/>
+            <a:ext cx="1224136" cy="725990"/>
+          </a:xfrm>
+          <a:prstGeom prst="rect">
+            <a:avLst/>
+          </a:prstGeom>
+        </p:spPr>
+        <p:style>
+          <a:lnRef idx="2">
+            <a:schemeClr val="accent1">
+              <a:shade val="50000"/>
+            </a:schemeClr>
+          </a:lnRef>
+          <a:fillRef idx="1">
+            <a:schemeClr val="accent1"/>
+          </a:fillRef>
+          <a:effectRef idx="0">
+            <a:schemeClr val="accent1"/>
+          </a:effectRef>
+          <a:fontRef idx="minor">
+            <a:schemeClr val="lt1"/>
+          </a:fontRef>
+        </p:style>
+        <p:txBody>
+          <a:bodyPr rtlCol="0" anchor="ctr"/>
+          <a:lstStyle/>
+          <a:p>
+            <a:pPr algn="ctr"/>
+            <a:r>
+              <a:rPr lang="zh-TW" altLang="en-US" dirty="0" smtClean="0"/>
+              <a:t>學童管理</a:t>
+            </a:r>
+            <a:endParaRPr lang="zh-TW" altLang="en-US" dirty="0"/>
+          </a:p>
+        </p:txBody>
+      </p:sp>
+      <p:sp>
+        <p:nvSpPr>
+          <p:cNvPr id="7" name="矩形 6"/>
+          <p:cNvSpPr/>
+          <p:nvPr/>
+        </p:nvSpPr>
+        <p:spPr>
+          <a:xfrm>
+            <a:off x="2555776" y="3429000"/>
+            <a:ext cx="1224136" cy="725990"/>
+          </a:xfrm>
+          <a:prstGeom prst="rect">
+            <a:avLst/>
+          </a:prstGeom>
+        </p:spPr>
+        <p:style>
+          <a:lnRef idx="2">
+            <a:schemeClr val="accent1">
+              <a:shade val="50000"/>
+            </a:schemeClr>
+          </a:lnRef>
+          <a:fillRef idx="1">
+            <a:schemeClr val="accent1"/>
+          </a:fillRef>
+          <a:effectRef idx="0">
+            <a:schemeClr val="accent1"/>
+          </a:effectRef>
+          <a:fontRef idx="minor">
+            <a:schemeClr val="lt1"/>
+          </a:fontRef>
+        </p:style>
+        <p:txBody>
+          <a:bodyPr rtlCol="0" anchor="ctr"/>
+          <a:lstStyle/>
+          <a:p>
+            <a:pPr algn="ctr"/>
+            <a:r>
+              <a:rPr lang="zh-TW" altLang="en-US" dirty="0" smtClean="0"/>
+              <a:t>首頁</a:t>
+            </a:r>
+            <a:endParaRPr lang="zh-TW" altLang="en-US" dirty="0"/>
+          </a:p>
+        </p:txBody>
+      </p:sp>
+      <p:sp>
+        <p:nvSpPr>
+          <p:cNvPr id="8" name="矩形 7"/>
+          <p:cNvSpPr/>
+          <p:nvPr/>
+        </p:nvSpPr>
+        <p:spPr>
+          <a:xfrm>
+            <a:off x="5148064" y="3950723"/>
+            <a:ext cx="1224136" cy="725990"/>
+          </a:xfrm>
+          <a:prstGeom prst="rect">
+            <a:avLst/>
+          </a:prstGeom>
+        </p:spPr>
+        <p:style>
+          <a:lnRef idx="2">
+            <a:schemeClr val="accent1">
+              <a:shade val="50000"/>
+            </a:schemeClr>
+          </a:lnRef>
+          <a:fillRef idx="1">
+            <a:schemeClr val="accent1"/>
+          </a:fillRef>
+          <a:effectRef idx="0">
+            <a:schemeClr val="accent1"/>
+          </a:effectRef>
+          <a:fontRef idx="minor">
+            <a:schemeClr val="lt1"/>
+          </a:fontRef>
+        </p:style>
+        <p:txBody>
+          <a:bodyPr rtlCol="0" anchor="ctr"/>
+          <a:lstStyle/>
+          <a:p>
+            <a:pPr algn="ctr"/>
+            <a:r>
+              <a:rPr lang="zh-TW" altLang="en-US" dirty="0" smtClean="0"/>
+              <a:t>兌換紀錄</a:t>
+            </a:r>
+            <a:endParaRPr lang="zh-TW" altLang="en-US" dirty="0"/>
+          </a:p>
+        </p:txBody>
+      </p:sp>
+      <p:sp>
+        <p:nvSpPr>
+          <p:cNvPr id="9" name="矩形 8"/>
+          <p:cNvSpPr/>
+          <p:nvPr/>
+        </p:nvSpPr>
+        <p:spPr>
+          <a:xfrm>
+            <a:off x="5148064" y="2216621"/>
+            <a:ext cx="1224136" cy="725990"/>
+          </a:xfrm>
+          <a:prstGeom prst="rect">
+            <a:avLst/>
+          </a:prstGeom>
+        </p:spPr>
+        <p:style>
+          <a:lnRef idx="2">
+            <a:schemeClr val="accent1">
+              <a:shade val="50000"/>
+            </a:schemeClr>
+          </a:lnRef>
+          <a:fillRef idx="1">
+            <a:schemeClr val="accent1"/>
+          </a:fillRef>
+          <a:effectRef idx="0">
+            <a:schemeClr val="accent1"/>
+          </a:effectRef>
+          <a:fontRef idx="minor">
+            <a:schemeClr val="lt1"/>
+          </a:fontRef>
+        </p:style>
+        <p:txBody>
+          <a:bodyPr rtlCol="0" anchor="ctr"/>
+          <a:lstStyle/>
+          <a:p>
+            <a:pPr algn="ctr"/>
+            <a:r>
+              <a:rPr lang="zh-TW" altLang="en-US" dirty="0" smtClean="0"/>
+              <a:t>店家管理</a:t>
+            </a:r>
+            <a:endParaRPr lang="zh-TW" altLang="en-US" dirty="0"/>
+          </a:p>
+        </p:txBody>
+      </p:sp>
+      <p:sp>
+        <p:nvSpPr>
+          <p:cNvPr id="10" name="矩形 9"/>
+          <p:cNvSpPr/>
+          <p:nvPr/>
+        </p:nvSpPr>
+        <p:spPr>
+          <a:xfrm>
+            <a:off x="5148064" y="3080717"/>
+            <a:ext cx="1224136" cy="725990"/>
+          </a:xfrm>
+          <a:prstGeom prst="rect">
+            <a:avLst/>
+          </a:prstGeom>
+        </p:spPr>
+        <p:style>
+          <a:lnRef idx="2">
+            <a:schemeClr val="accent1">
+              <a:shade val="50000"/>
+            </a:schemeClr>
+          </a:lnRef>
+          <a:fillRef idx="1">
+            <a:schemeClr val="accent1"/>
+          </a:fillRef>
+          <a:effectRef idx="0">
+            <a:schemeClr val="accent1"/>
+          </a:effectRef>
+          <a:fontRef idx="minor">
+            <a:schemeClr val="lt1"/>
+          </a:fontRef>
+        </p:style>
+        <p:txBody>
+          <a:bodyPr rtlCol="0" anchor="ctr"/>
+          <a:lstStyle/>
+          <a:p>
+            <a:pPr algn="ctr"/>
+            <a:r>
+              <a:rPr lang="zh-TW" altLang="en-US" dirty="0" smtClean="0"/>
+              <a:t>點數管理</a:t>
+            </a:r>
+            <a:endParaRPr lang="zh-TW" altLang="en-US" dirty="0"/>
+          </a:p>
+        </p:txBody>
+      </p:sp>
+      <p:sp>
+        <p:nvSpPr>
+          <p:cNvPr id="11" name="矩形 10"/>
+          <p:cNvSpPr/>
+          <p:nvPr/>
+        </p:nvSpPr>
+        <p:spPr>
+          <a:xfrm>
+            <a:off x="5148064" y="4808909"/>
+            <a:ext cx="1224136" cy="725990"/>
+          </a:xfrm>
+          <a:prstGeom prst="rect">
+            <a:avLst/>
+          </a:prstGeom>
+        </p:spPr>
+        <p:style>
+          <a:lnRef idx="2">
+            <a:schemeClr val="accent1">
+              <a:shade val="50000"/>
+            </a:schemeClr>
+          </a:lnRef>
+          <a:fillRef idx="1">
+            <a:schemeClr val="accent1"/>
+          </a:fillRef>
+          <a:effectRef idx="0">
+            <a:schemeClr val="accent1"/>
+          </a:effectRef>
+          <a:fontRef idx="minor">
+            <a:schemeClr val="lt1"/>
+          </a:fontRef>
+        </p:style>
+        <p:txBody>
+          <a:bodyPr rtlCol="0" anchor="ctr"/>
+          <a:lstStyle/>
+          <a:p>
+            <a:pPr algn="ctr"/>
+            <a:r>
+              <a:rPr lang="zh-TW" altLang="en-US" dirty="0" smtClean="0"/>
+              <a:t>系統參數</a:t>
+            </a:r>
+            <a:endParaRPr lang="zh-TW" altLang="en-US" dirty="0"/>
+          </a:p>
+        </p:txBody>
+      </p:sp>
+      <p:sp>
+        <p:nvSpPr>
+          <p:cNvPr id="12" name="矩形 11"/>
+          <p:cNvSpPr/>
+          <p:nvPr/>
+        </p:nvSpPr>
+        <p:spPr>
+          <a:xfrm>
+            <a:off x="5148064" y="5673005"/>
+            <a:ext cx="1224136" cy="725990"/>
+          </a:xfrm>
+          <a:prstGeom prst="rect">
+            <a:avLst/>
+          </a:prstGeom>
+        </p:spPr>
+        <p:style>
+          <a:lnRef idx="2">
+            <a:schemeClr val="accent1">
+              <a:shade val="50000"/>
+            </a:schemeClr>
+          </a:lnRef>
+          <a:fillRef idx="1">
+            <a:schemeClr val="accent1"/>
+          </a:fillRef>
+          <a:effectRef idx="0">
+            <a:schemeClr val="accent1"/>
+          </a:effectRef>
+          <a:fontRef idx="minor">
+            <a:schemeClr val="lt1"/>
+          </a:fontRef>
+        </p:style>
+        <p:txBody>
+          <a:bodyPr rtlCol="0" anchor="ctr"/>
+          <a:lstStyle/>
+          <a:p>
+            <a:pPr algn="ctr"/>
+            <a:r>
+              <a:rPr lang="zh-TW" altLang="en-US" dirty="0" smtClean="0"/>
+              <a:t>系統日誌</a:t>
+            </a:r>
+            <a:endParaRPr lang="zh-TW" altLang="en-US" dirty="0"/>
+          </a:p>
+        </p:txBody>
+      </p:sp>
+      <p:cxnSp>
+        <p:nvCxnSpPr>
+          <p:cNvPr id="13" name="肘形接點 12"/>
+          <p:cNvCxnSpPr>
+            <a:stCxn id="2" idx="1"/>
+            <a:endCxn id="7" idx="3"/>
+          </p:cNvCxnSpPr>
+          <p:nvPr/>
+        </p:nvCxnSpPr>
+        <p:spPr>
+          <a:xfrm rot="10800000" flipV="1">
+            <a:off x="3779912" y="1703763"/>
+            <a:ext cx="1368152" cy="2088232"/>
+          </a:xfrm>
+          <a:prstGeom prst="bentConnector3">
+            <a:avLst/>
+          </a:prstGeom>
+        </p:spPr>
+        <p:style>
+          <a:lnRef idx="1">
+            <a:schemeClr val="accent1"/>
+          </a:lnRef>
+          <a:fillRef idx="0">
+            <a:schemeClr val="accent1"/>
+          </a:fillRef>
+          <a:effectRef idx="0">
+            <a:schemeClr val="accent1"/>
+          </a:effectRef>
+          <a:fontRef idx="minor">
+            <a:schemeClr val="tx1"/>
+          </a:fontRef>
+        </p:style>
+      </p:cxnSp>
+      <p:cxnSp>
+        <p:nvCxnSpPr>
+          <p:cNvPr id="15" name="肘形接點 14"/>
+          <p:cNvCxnSpPr>
+            <a:stCxn id="9" idx="1"/>
+          </p:cNvCxnSpPr>
+          <p:nvPr/>
+        </p:nvCxnSpPr>
+        <p:spPr>
+          <a:xfrm rot="10800000" flipV="1">
+            <a:off x="3779912" y="2579615"/>
+            <a:ext cx="1368152" cy="1227091"/>
+          </a:xfrm>
+          <a:prstGeom prst="bentConnector3">
+            <a:avLst>
+              <a:gd name="adj1" fmla="val 50000"/>
+            </a:avLst>
+          </a:prstGeom>
+        </p:spPr>
+        <p:style>
+          <a:lnRef idx="1">
+            <a:schemeClr val="accent1"/>
+          </a:lnRef>
+          <a:fillRef idx="0">
+            <a:schemeClr val="accent1"/>
+          </a:fillRef>
+          <a:effectRef idx="0">
+            <a:schemeClr val="accent1"/>
+          </a:effectRef>
+          <a:fontRef idx="minor">
+            <a:schemeClr val="tx1"/>
+          </a:fontRef>
+        </p:style>
+      </p:cxnSp>
+      <p:cxnSp>
+        <p:nvCxnSpPr>
+          <p:cNvPr id="18" name="肘形接點 17"/>
+          <p:cNvCxnSpPr>
+            <a:stCxn id="10" idx="1"/>
+            <a:endCxn id="7" idx="3"/>
+          </p:cNvCxnSpPr>
+          <p:nvPr/>
+        </p:nvCxnSpPr>
+        <p:spPr>
+          <a:xfrm rot="10800000" flipV="1">
+            <a:off x="3779912" y="3443711"/>
+            <a:ext cx="1368152" cy="348283"/>
+          </a:xfrm>
+          <a:prstGeom prst="bentConnector3">
+            <a:avLst/>
+          </a:prstGeom>
+        </p:spPr>
+        <p:style>
+          <a:lnRef idx="1">
+            <a:schemeClr val="accent1"/>
+          </a:lnRef>
+          <a:fillRef idx="0">
+            <a:schemeClr val="accent1"/>
+          </a:fillRef>
+          <a:effectRef idx="0">
+            <a:schemeClr val="accent1"/>
+          </a:effectRef>
+          <a:fontRef idx="minor">
+            <a:schemeClr val="tx1"/>
+          </a:fontRef>
+        </p:style>
+      </p:cxnSp>
+      <p:cxnSp>
+        <p:nvCxnSpPr>
+          <p:cNvPr id="20" name="肘形接點 19"/>
+          <p:cNvCxnSpPr>
+            <a:stCxn id="8" idx="1"/>
+            <a:endCxn id="7" idx="3"/>
+          </p:cNvCxnSpPr>
+          <p:nvPr/>
+        </p:nvCxnSpPr>
+        <p:spPr>
+          <a:xfrm rot="10800000">
+            <a:off x="3779912" y="3791996"/>
+            <a:ext cx="1368152" cy="521723"/>
+          </a:xfrm>
+          <a:prstGeom prst="bentConnector3">
+            <a:avLst/>
+          </a:prstGeom>
+        </p:spPr>
+        <p:style>
+          <a:lnRef idx="1">
+            <a:schemeClr val="accent1"/>
+          </a:lnRef>
+          <a:fillRef idx="0">
+            <a:schemeClr val="accent1"/>
+          </a:fillRef>
+          <a:effectRef idx="0">
+            <a:schemeClr val="accent1"/>
+          </a:effectRef>
+          <a:fontRef idx="minor">
+            <a:schemeClr val="tx1"/>
+          </a:fontRef>
+        </p:style>
+      </p:cxnSp>
+      <p:cxnSp>
+        <p:nvCxnSpPr>
+          <p:cNvPr id="22" name="肘形接點 21"/>
+          <p:cNvCxnSpPr>
+            <a:stCxn id="11" idx="1"/>
+            <a:endCxn id="7" idx="3"/>
+          </p:cNvCxnSpPr>
+          <p:nvPr/>
+        </p:nvCxnSpPr>
+        <p:spPr>
+          <a:xfrm rot="10800000">
+            <a:off x="3779912" y="3791996"/>
+            <a:ext cx="1368152" cy="1379909"/>
+          </a:xfrm>
+          <a:prstGeom prst="bentConnector3">
+            <a:avLst/>
+          </a:prstGeom>
+        </p:spPr>
+        <p:style>
+          <a:lnRef idx="1">
+            <a:schemeClr val="accent1"/>
+          </a:lnRef>
+          <a:fillRef idx="0">
+            <a:schemeClr val="accent1"/>
+          </a:fillRef>
+          <a:effectRef idx="0">
+            <a:schemeClr val="accent1"/>
+          </a:effectRef>
+          <a:fontRef idx="minor">
+            <a:schemeClr val="tx1"/>
+          </a:fontRef>
+        </p:style>
+      </p:cxnSp>
+      <p:cxnSp>
+        <p:nvCxnSpPr>
+          <p:cNvPr id="24" name="肘形接點 23"/>
+          <p:cNvCxnSpPr>
+            <a:stCxn id="12" idx="1"/>
+            <a:endCxn id="7" idx="3"/>
+          </p:cNvCxnSpPr>
+          <p:nvPr/>
+        </p:nvCxnSpPr>
+        <p:spPr>
+          <a:xfrm rot="10800000">
+            <a:off x="3779912" y="3791996"/>
+            <a:ext cx="1368152" cy="2244005"/>
+          </a:xfrm>
+          <a:prstGeom prst="bentConnector3">
+            <a:avLst/>
+          </a:prstGeom>
+        </p:spPr>
+        <p:style>
+          <a:lnRef idx="1">
+            <a:schemeClr val="accent1"/>
+          </a:lnRef>
+          <a:fillRef idx="0">
+            <a:schemeClr val="accent1"/>
+          </a:fillRef>
+          <a:effectRef idx="0">
+            <a:schemeClr val="accent1"/>
+          </a:effectRef>
+          <a:fontRef idx="minor">
+            <a:schemeClr val="tx1"/>
+          </a:fontRef>
+        </p:style>
+      </p:cxnSp>
+    </p:spTree>
+    <p:extLst>
+      <p:ext uri="{BB962C8B-B14F-4D97-AF65-F5344CB8AC3E}">
+        <p14:creationId xmlns:p14="http://schemas.microsoft.com/office/powerpoint/2010/main" val="3268592478"/>
+      </p:ext>
+    </p:extLst>
+  </p:cSld>
+  <p:clrMapOvr>
+    <a:masterClrMapping/>
+  </p:clrMapOvr>
+  <p:timing>
+    <p:tnLst>
+      <p:par>
+        <p:cTn id="1" dur="indefinite" restart="never" nodeType="tmRoot"/>
+      </p:par>
+    </p:tnLst>
+  </p:timing>
+</p:sld>
+</file>
+
+<file path=ppt/slides/slide3.xml><?xml version="1.0" encoding="utf-8"?>
+<p:sld xmlns:a="http://schemas.openxmlformats.org/drawingml/2006/main" xmlns:r="http://schemas.openxmlformats.org/officeDocument/2006/relationships" xmlns:p="http://schemas.openxmlformats.org/presentationml/2006/main">
+  <p:cSld>
+    <p:spTree>
+      <p:nvGrpSpPr>
+        <p:cNvPr id="1" name=""/>
+        <p:cNvGrpSpPr/>
+        <p:nvPr/>
+      </p:nvGrpSpPr>
+      <p:grpSpPr>
+        <a:xfrm>
+          <a:off x="0" y="0"/>
+          <a:ext cx="0" cy="0"/>
+          <a:chOff x="0" y="0"/>
+          <a:chExt cx="0" cy="0"/>
+        </a:xfrm>
+      </p:grpSpPr>
+      <p:sp>
+        <p:nvSpPr>
+          <p:cNvPr id="4" name="標題 1"/>
+          <p:cNvSpPr txBox="1">
+            <a:spLocks/>
+          </p:cNvSpPr>
+          <p:nvPr/>
+        </p:nvSpPr>
+        <p:spPr>
+          <a:xfrm>
+            <a:off x="914211" y="764704"/>
+            <a:ext cx="7543800" cy="720080"/>
+          </a:xfrm>
+          <a:prstGeom prst="rect">
+            <a:avLst/>
+          </a:prstGeom>
+        </p:spPr>
+        <p:txBody>
+          <a:bodyPr vert="horz" lIns="91440" tIns="45720" rIns="91440" bIns="45720" rtlCol="0" anchor="b">
+            <a:noAutofit/>
+          </a:bodyPr>
+          <a:lstStyle>
+            <a:lvl1pPr algn="l" defTabSz="914400" rtl="0" eaLnBrk="1" latinLnBrk="0" hangingPunct="1">
+              <a:spcBef>
+                <a:spcPct val="0"/>
+              </a:spcBef>
+              <a:buNone/>
+              <a:defRPr sz="6000" kern="1200">
+                <a:solidFill>
+                  <a:schemeClr val="tx1"/>
+                </a:solidFill>
+                <a:effectLst>
+                  <a:outerShdw blurRad="38100" dist="38100" dir="2700000" algn="tl">
+                    <a:srgbClr val="000000">
+                      <a:alpha val="43137"/>
+                    </a:srgbClr>
+                  </a:outerShdw>
+                </a:effectLst>
+                <a:latin typeface="+mj-lt"/>
+                <a:ea typeface="+mj-ea"/>
+                <a:cs typeface="+mj-cs"/>
+              </a:defRPr>
+            </a:lvl1pPr>
+            <a:lvl2pPr eaLnBrk="1" hangingPunct="1">
+              <a:defRPr>
+                <a:solidFill>
+                  <a:schemeClr val="tx2"/>
+                </a:solidFill>
+              </a:defRPr>
+            </a:lvl2pPr>
+            <a:lvl3pPr eaLnBrk="1" hangingPunct="1">
+              <a:defRPr>
+                <a:solidFill>
+                  <a:schemeClr val="tx2"/>
+                </a:solidFill>
+              </a:defRPr>
+            </a:lvl3pPr>
+            <a:lvl4pPr eaLnBrk="1" hangingPunct="1">
+              <a:defRPr>
+                <a:solidFill>
+                  <a:schemeClr val="tx2"/>
+                </a:solidFill>
+              </a:defRPr>
+            </a:lvl4pPr>
+            <a:lvl5pPr eaLnBrk="1" hangingPunct="1">
+              <a:defRPr>
+                <a:solidFill>
+                  <a:schemeClr val="tx2"/>
+                </a:solidFill>
+              </a:defRPr>
+            </a:lvl5pPr>
+            <a:lvl6pPr eaLnBrk="1" hangingPunct="1">
+              <a:defRPr>
+                <a:solidFill>
+                  <a:schemeClr val="tx2"/>
+                </a:solidFill>
+              </a:defRPr>
+            </a:lvl6pPr>
+            <a:lvl7pPr eaLnBrk="1" hangingPunct="1">
+              <a:defRPr>
+                <a:solidFill>
+                  <a:schemeClr val="tx2"/>
+                </a:solidFill>
+              </a:defRPr>
+            </a:lvl7pPr>
+            <a:lvl8pPr eaLnBrk="1" hangingPunct="1">
+              <a:defRPr>
+                <a:solidFill>
+                  <a:schemeClr val="tx2"/>
+                </a:solidFill>
+              </a:defRPr>
+            </a:lvl8pPr>
+            <a:lvl9pPr eaLnBrk="1" hangingPunct="1">
+              <a:defRPr>
+                <a:solidFill>
+                  <a:schemeClr val="tx2"/>
+                </a:solidFill>
+              </a:defRPr>
+            </a:lvl9pPr>
+          </a:lstStyle>
+          <a:p>
+            <a:r>
+              <a:rPr lang="zh-TW" altLang="en-US" sz="4000" b="1" dirty="0"/>
+              <a:t>全</a:t>
+            </a:r>
+            <a:r>
+              <a:rPr lang="zh-TW" altLang="en-US" sz="4000" b="1" dirty="0" smtClean="0"/>
+              <a:t>幅展示</a:t>
+            </a:r>
+            <a:r>
+              <a:rPr lang="zh-TW" altLang="en-US" sz="4000" b="1" dirty="0" smtClean="0"/>
+              <a:t> </a:t>
+            </a:r>
+            <a:endParaRPr lang="zh-TW" altLang="en-US" sz="4000" b="1" dirty="0"/>
+          </a:p>
+        </p:txBody>
+      </p:sp>
+      <p:pic>
+        <p:nvPicPr>
+          <p:cNvPr id="1026" name="Picture 2"/>
+          <p:cNvPicPr>
+            <a:picLocks noChangeAspect="1" noChangeArrowheads="1"/>
+          </p:cNvPicPr>
+          <p:nvPr/>
+        </p:nvPicPr>
+        <p:blipFill>
+          <a:blip r:embed="rId2">
+            <a:extLst>
+              <a:ext uri="{28A0092B-C50C-407E-A947-70E740481C1C}">
+                <a14:useLocalDpi xmlns:a14="http://schemas.microsoft.com/office/drawing/2010/main" val="0"/>
+              </a:ext>
+            </a:extLst>
+          </a:blip>
+          <a:srcRect/>
+          <a:stretch>
+            <a:fillRect/>
+          </a:stretch>
+        </p:blipFill>
+        <p:spPr bwMode="auto">
+          <a:xfrm>
+            <a:off x="395535" y="2204865"/>
+            <a:ext cx="8386187" cy="4137776"/>
+          </a:xfrm>
+          <a:prstGeom prst="rect">
+            <a:avLst/>
+          </a:prstGeom>
+          <a:noFill/>
+          <a:ln>
+            <a:noFill/>
+          </a:ln>
+          <a:effectLst/>
+          <a:extLst>
+            <a:ext uri="{909E8E84-426E-40DD-AFC4-6F175D3DCCD1}">
+              <a14:hiddenFill xmlns:a14="http://schemas.microsoft.com/office/drawing/2010/main">
+                <a:solidFill>
+                  <a:schemeClr val="accent1"/>
+                </a:solidFill>
+              </a14:hiddenFill>
+            </a:ext>
+            <a:ext uri="{91240B29-F687-4F45-9708-019B960494DF}">
+              <a14:hiddenLine xmlns:a14="http://schemas.microsoft.com/office/drawing/2010/main" w="9525">
+                <a:solidFill>
+                  <a:schemeClr val="tx1"/>
+                </a:solidFill>
+                <a:miter lim="800000"/>
+                <a:headEnd/>
+                <a:tailEnd/>
+              </a14:hiddenLine>
+            </a:ext>
+            <a:ext uri="{AF507438-7753-43E0-B8FC-AC1667EBCBE1}">
+              <a14:hiddenEffects xmlns:a14="http://schemas.microsoft.com/office/drawing/2010/main">
+                <a:effectLst>
+                  <a:outerShdw dist="35921" dir="2700000" algn="ctr" rotWithShape="0">
+                    <a:schemeClr val="bg2"/>
+                  </a:outerShdw>
+                </a:effectLst>
+              </a14:hiddenEffects>
+            </a:ext>
+          </a:extLst>
+        </p:spPr>
+      </p:pic>
+    </p:spTree>
+    <p:extLst>
+      <p:ext uri="{BB962C8B-B14F-4D97-AF65-F5344CB8AC3E}">
+        <p14:creationId xmlns:p14="http://schemas.microsoft.com/office/powerpoint/2010/main" val="1364279349"/>
+      </p:ext>
+    </p:extLst>
+  </p:cSld>
+  <p:clrMapOvr>
+    <a:masterClrMapping/>
+  </p:clrMapOvr>
+  <p:timing>
+    <p:tnLst>
+      <p:par>
+        <p:cTn id="1" dur="indefinite" restart="never" nodeType="tmRoot"/>
+      </p:par>
+    </p:tnLst>
+  </p:timing>
+</p:sld>
+</file>
+
+<file path=ppt/slides/slide4.xml><?xml version="1.0" encoding="utf-8"?>
+<p:sld xmlns:a="http://schemas.openxmlformats.org/drawingml/2006/main" xmlns:r="http://schemas.openxmlformats.org/officeDocument/2006/relationships" xmlns:p="http://schemas.openxmlformats.org/presentationml/2006/main">
+  <p:cSld>
+    <p:spTree>
+      <p:nvGrpSpPr>
+        <p:cNvPr id="1" name=""/>
+        <p:cNvGrpSpPr/>
+        <p:nvPr/>
+      </p:nvGrpSpPr>
+      <p:grpSpPr>
+        <a:xfrm>
+          <a:off x="0" y="0"/>
+          <a:ext cx="0" cy="0"/>
+          <a:chOff x="0" y="0"/>
+          <a:chExt cx="0" cy="0"/>
+        </a:xfrm>
+      </p:grpSpPr>
+      <p:sp>
+        <p:nvSpPr>
+          <p:cNvPr id="4" name="標題 1"/>
+          <p:cNvSpPr txBox="1">
+            <a:spLocks/>
+          </p:cNvSpPr>
+          <p:nvPr/>
+        </p:nvSpPr>
+        <p:spPr>
+          <a:xfrm>
+            <a:off x="914211" y="764704"/>
+            <a:ext cx="7543800" cy="720080"/>
+          </a:xfrm>
+          <a:prstGeom prst="rect">
+            <a:avLst/>
+          </a:prstGeom>
+        </p:spPr>
+        <p:txBody>
+          <a:bodyPr vert="horz" lIns="91440" tIns="45720" rIns="91440" bIns="45720" rtlCol="0" anchor="b">
+            <a:noAutofit/>
+          </a:bodyPr>
+          <a:lstStyle>
+            <a:lvl1pPr algn="l" defTabSz="914400" rtl="0" eaLnBrk="1" latinLnBrk="0" hangingPunct="1">
+              <a:spcBef>
+                <a:spcPct val="0"/>
+              </a:spcBef>
+              <a:buNone/>
+              <a:defRPr sz="6000" kern="1200">
+                <a:solidFill>
+                  <a:schemeClr val="tx1"/>
+                </a:solidFill>
+                <a:effectLst>
+                  <a:outerShdw blurRad="38100" dist="38100" dir="2700000" algn="tl">
+                    <a:srgbClr val="000000">
+                      <a:alpha val="43137"/>
+                    </a:srgbClr>
+                  </a:outerShdw>
+                </a:effectLst>
+                <a:latin typeface="+mj-lt"/>
+                <a:ea typeface="+mj-ea"/>
+                <a:cs typeface="+mj-cs"/>
+              </a:defRPr>
+            </a:lvl1pPr>
+            <a:lvl2pPr eaLnBrk="1" hangingPunct="1">
+              <a:defRPr>
+                <a:solidFill>
+                  <a:schemeClr val="tx2"/>
+                </a:solidFill>
+              </a:defRPr>
+            </a:lvl2pPr>
+            <a:lvl3pPr eaLnBrk="1" hangingPunct="1">
+              <a:defRPr>
+                <a:solidFill>
+                  <a:schemeClr val="tx2"/>
+                </a:solidFill>
+              </a:defRPr>
+            </a:lvl3pPr>
+            <a:lvl4pPr eaLnBrk="1" hangingPunct="1">
+              <a:defRPr>
+                <a:solidFill>
+                  <a:schemeClr val="tx2"/>
+                </a:solidFill>
+              </a:defRPr>
+            </a:lvl4pPr>
+            <a:lvl5pPr eaLnBrk="1" hangingPunct="1">
+              <a:defRPr>
+                <a:solidFill>
+                  <a:schemeClr val="tx2"/>
+                </a:solidFill>
+              </a:defRPr>
+            </a:lvl5pPr>
+            <a:lvl6pPr eaLnBrk="1" hangingPunct="1">
+              <a:defRPr>
+                <a:solidFill>
+                  <a:schemeClr val="tx2"/>
+                </a:solidFill>
+              </a:defRPr>
+            </a:lvl6pPr>
+            <a:lvl7pPr eaLnBrk="1" hangingPunct="1">
+              <a:defRPr>
+                <a:solidFill>
+                  <a:schemeClr val="tx2"/>
+                </a:solidFill>
+              </a:defRPr>
+            </a:lvl7pPr>
+            <a:lvl8pPr eaLnBrk="1" hangingPunct="1">
+              <a:defRPr>
+                <a:solidFill>
+                  <a:schemeClr val="tx2"/>
+                </a:solidFill>
+              </a:defRPr>
+            </a:lvl8pPr>
+            <a:lvl9pPr eaLnBrk="1" hangingPunct="1">
+              <a:defRPr>
+                <a:solidFill>
+                  <a:schemeClr val="tx2"/>
+                </a:solidFill>
+              </a:defRPr>
+            </a:lvl9pPr>
+          </a:lstStyle>
+          <a:p>
+            <a:r>
+              <a:rPr lang="zh-TW" altLang="en-US" sz="4000" b="1" dirty="0" smtClean="0"/>
               <a:t>首頁 </a:t>
             </a:r>
             <a:r>
@@ -4342,8 +5731,8 @@
         </p:blipFill>
         <p:spPr bwMode="auto">
           <a:xfrm>
-            <a:off x="4686111" y="1403454"/>
-            <a:ext cx="2880320" cy="4916796"/>
+            <a:off x="4572000" y="1628800"/>
+            <a:ext cx="2851372" cy="4867379"/>
           </a:xfrm>
           <a:prstGeom prst="rect">
             <a:avLst/>
@@ -4403,7 +5792,7 @@
 </p:sld>
 </file>
 
-<file path=ppt/slides/slide3.xml><?xml version="1.0" encoding="utf-8"?>
+<file path=ppt/slides/slide5.xml><?xml version="1.0" encoding="utf-8"?>
 <p:sld xmlns:a="http://schemas.openxmlformats.org/drawingml/2006/main" xmlns:r="http://schemas.openxmlformats.org/officeDocument/2006/relationships" xmlns:p="http://schemas.openxmlformats.org/presentationml/2006/main">
   <p:cSld>
     <p:spTree>
@@ -4539,7 +5928,7 @@
       </p:sp>
       <p:pic>
         <p:nvPicPr>
-          <p:cNvPr id="8194" name="Picture 2"/>
+          <p:cNvPr id="2050" name="Picture 2"/>
           <p:cNvPicPr>
             <a:picLocks noChangeAspect="1" noChangeArrowheads="1"/>
           </p:cNvPicPr>
@@ -4560,8 +5949,8 @@
         </p:blipFill>
         <p:spPr bwMode="auto">
           <a:xfrm>
-            <a:off x="824682" y="2857512"/>
-            <a:ext cx="7722858" cy="792088"/>
+            <a:off x="1763687" y="2204864"/>
+            <a:ext cx="5610525" cy="3701240"/>
           </a:xfrm>
           <a:prstGeom prst="rect">
             <a:avLst/>
@@ -4621,7 +6010,7 @@
 </p:sld>
 </file>
 
-<file path=ppt/slides/slide4.xml><?xml version="1.0" encoding="utf-8"?>
+<file path=ppt/slides/slide6.xml><?xml version="1.0" encoding="utf-8"?>
 <p:sld xmlns:a="http://schemas.openxmlformats.org/drawingml/2006/main" xmlns:r="http://schemas.openxmlformats.org/officeDocument/2006/relationships" xmlns:p="http://schemas.openxmlformats.org/presentationml/2006/main">
   <p:cSld>
     <p:spTree>
@@ -4837,7 +6226,7 @@
 </p:sld>
 </file>
 
-<file path=ppt/slides/slide5.xml><?xml version="1.0" encoding="utf-8"?>
+<file path=ppt/slides/slide7.xml><?xml version="1.0" encoding="utf-8"?>
 <p:sld xmlns:a="http://schemas.openxmlformats.org/drawingml/2006/main" xmlns:r="http://schemas.openxmlformats.org/officeDocument/2006/relationships" xmlns:p="http://schemas.openxmlformats.org/presentationml/2006/main">
   <p:cSld>
     <p:spTree>
@@ -5053,7 +6442,7 @@
 </p:sld>
 </file>
 
-<file path=ppt/slides/slide6.xml><?xml version="1.0" encoding="utf-8"?>
+<file path=ppt/slides/slide8.xml><?xml version="1.0" encoding="utf-8"?>
 <p:sld xmlns:a="http://schemas.openxmlformats.org/drawingml/2006/main" xmlns:r="http://schemas.openxmlformats.org/officeDocument/2006/relationships" xmlns:p="http://schemas.openxmlformats.org/presentationml/2006/main">
   <p:cSld>
     <p:spTree>
@@ -5269,7 +6658,7 @@
 </p:sld>
 </file>
 
-<file path=ppt/slides/slide7.xml><?xml version="1.0" encoding="utf-8"?>
+<file path=ppt/slides/slide9.xml><?xml version="1.0" encoding="utf-8"?>
 <p:sld xmlns:a="http://schemas.openxmlformats.org/drawingml/2006/main" xmlns:r="http://schemas.openxmlformats.org/officeDocument/2006/relationships" xmlns:p="http://schemas.openxmlformats.org/presentationml/2006/main">
   <p:cSld>
     <p:spTree>
@@ -5397,11 +6786,7 @@
             </a:r>
             <a:r>
               <a:rPr lang="zh-TW" altLang="en-US" sz="4000" b="1" dirty="0"/>
-              <a:t> 點數</a:t>
-            </a:r>
-            <a:r>
-              <a:rPr lang="zh-TW" altLang="en-US" sz="4000" b="1" dirty="0"/>
-              <a:t>列表</a:t>
+              <a:t> 點數列表</a:t>
             </a:r>
           </a:p>
         </p:txBody>
@@ -5472,450 +6857,6 @@
     <p:extLst>
       <p:ext uri="{BB962C8B-B14F-4D97-AF65-F5344CB8AC3E}">
         <p14:creationId xmlns:p14="http://schemas.microsoft.com/office/powerpoint/2010/main" val="928717673"/>
-      </p:ext>
-    </p:extLst>
-  </p:cSld>
-  <p:clrMapOvr>
-    <a:masterClrMapping/>
-  </p:clrMapOvr>
-  <p:timing>
-    <p:tnLst>
-      <p:par>
-        <p:cTn id="1" dur="indefinite" restart="never" nodeType="tmRoot"/>
-      </p:par>
-    </p:tnLst>
-  </p:timing>
-</p:sld>
-</file>
-
-<file path=ppt/slides/slide8.xml><?xml version="1.0" encoding="utf-8"?>
-<p:sld xmlns:a="http://schemas.openxmlformats.org/drawingml/2006/main" xmlns:r="http://schemas.openxmlformats.org/officeDocument/2006/relationships" xmlns:p="http://schemas.openxmlformats.org/presentationml/2006/main">
-  <p:cSld>
-    <p:spTree>
-      <p:nvGrpSpPr>
-        <p:cNvPr id="1" name=""/>
-        <p:cNvGrpSpPr/>
-        <p:nvPr/>
-      </p:nvGrpSpPr>
-      <p:grpSpPr>
-        <a:xfrm>
-          <a:off x="0" y="0"/>
-          <a:ext cx="0" cy="0"/>
-          <a:chOff x="0" y="0"/>
-          <a:chExt cx="0" cy="0"/>
-        </a:xfrm>
-      </p:grpSpPr>
-      <p:sp>
-        <p:nvSpPr>
-          <p:cNvPr id="4" name="標題 1"/>
-          <p:cNvSpPr txBox="1">
-            <a:spLocks/>
-          </p:cNvSpPr>
-          <p:nvPr/>
-        </p:nvSpPr>
-        <p:spPr>
-          <a:xfrm>
-            <a:off x="914211" y="764704"/>
-            <a:ext cx="7543800" cy="720080"/>
-          </a:xfrm>
-          <a:prstGeom prst="rect">
-            <a:avLst/>
-          </a:prstGeom>
-        </p:spPr>
-        <p:txBody>
-          <a:bodyPr vert="horz" lIns="91440" tIns="45720" rIns="91440" bIns="45720" rtlCol="0" anchor="b">
-            <a:noAutofit/>
-          </a:bodyPr>
-          <a:lstStyle>
-            <a:lvl1pPr algn="l" defTabSz="914400" rtl="0" eaLnBrk="1" latinLnBrk="0" hangingPunct="1">
-              <a:spcBef>
-                <a:spcPct val="0"/>
-              </a:spcBef>
-              <a:buNone/>
-              <a:defRPr sz="6000" kern="1200">
-                <a:solidFill>
-                  <a:schemeClr val="tx1"/>
-                </a:solidFill>
-                <a:effectLst>
-                  <a:outerShdw blurRad="38100" dist="38100" dir="2700000" algn="tl">
-                    <a:srgbClr val="000000">
-                      <a:alpha val="43137"/>
-                    </a:srgbClr>
-                  </a:outerShdw>
-                </a:effectLst>
-                <a:latin typeface="+mj-lt"/>
-                <a:ea typeface="+mj-ea"/>
-                <a:cs typeface="+mj-cs"/>
-              </a:defRPr>
-            </a:lvl1pPr>
-            <a:lvl2pPr eaLnBrk="1" hangingPunct="1">
-              <a:defRPr>
-                <a:solidFill>
-                  <a:schemeClr val="tx2"/>
-                </a:solidFill>
-              </a:defRPr>
-            </a:lvl2pPr>
-            <a:lvl3pPr eaLnBrk="1" hangingPunct="1">
-              <a:defRPr>
-                <a:solidFill>
-                  <a:schemeClr val="tx2"/>
-                </a:solidFill>
-              </a:defRPr>
-            </a:lvl3pPr>
-            <a:lvl4pPr eaLnBrk="1" hangingPunct="1">
-              <a:defRPr>
-                <a:solidFill>
-                  <a:schemeClr val="tx2"/>
-                </a:solidFill>
-              </a:defRPr>
-            </a:lvl4pPr>
-            <a:lvl5pPr eaLnBrk="1" hangingPunct="1">
-              <a:defRPr>
-                <a:solidFill>
-                  <a:schemeClr val="tx2"/>
-                </a:solidFill>
-              </a:defRPr>
-            </a:lvl5pPr>
-            <a:lvl6pPr eaLnBrk="1" hangingPunct="1">
-              <a:defRPr>
-                <a:solidFill>
-                  <a:schemeClr val="tx2"/>
-                </a:solidFill>
-              </a:defRPr>
-            </a:lvl6pPr>
-            <a:lvl7pPr eaLnBrk="1" hangingPunct="1">
-              <a:defRPr>
-                <a:solidFill>
-                  <a:schemeClr val="tx2"/>
-                </a:solidFill>
-              </a:defRPr>
-            </a:lvl7pPr>
-            <a:lvl8pPr eaLnBrk="1" hangingPunct="1">
-              <a:defRPr>
-                <a:solidFill>
-                  <a:schemeClr val="tx2"/>
-                </a:solidFill>
-              </a:defRPr>
-            </a:lvl8pPr>
-            <a:lvl9pPr eaLnBrk="1" hangingPunct="1">
-              <a:defRPr>
-                <a:solidFill>
-                  <a:schemeClr val="tx2"/>
-                </a:solidFill>
-              </a:defRPr>
-            </a:lvl9pPr>
-          </a:lstStyle>
-          <a:p>
-            <a:r>
-              <a:rPr lang="zh-TW" altLang="en-US" sz="4000" b="1" dirty="0" smtClean="0"/>
-              <a:t>首頁 </a:t>
-            </a:r>
-            <a:r>
-              <a:rPr lang="en-US" altLang="zh-TW" sz="4000" b="1" dirty="0"/>
-              <a:t>/</a:t>
-            </a:r>
-            <a:r>
-              <a:rPr lang="zh-TW" altLang="en-US" sz="4000" b="1" dirty="0"/>
-              <a:t> </a:t>
-            </a:r>
-            <a:r>
-              <a:rPr lang="zh-TW" altLang="en-US" sz="4000" b="1" dirty="0" smtClean="0"/>
-              <a:t>兌換紀錄</a:t>
-            </a:r>
-            <a:endParaRPr lang="zh-TW" altLang="en-US" sz="4000" b="1" dirty="0"/>
-          </a:p>
-        </p:txBody>
-      </p:sp>
-      <p:pic>
-        <p:nvPicPr>
-          <p:cNvPr id="5122" name="Picture 2"/>
-          <p:cNvPicPr>
-            <a:picLocks noChangeAspect="1" noChangeArrowheads="1"/>
-          </p:cNvPicPr>
-          <p:nvPr/>
-        </p:nvPicPr>
-        <p:blipFill>
-          <a:blip r:embed="rId2">
-            <a:extLst>
-              <a:ext uri="{28A0092B-C50C-407E-A947-70E740481C1C}">
-                <a14:useLocalDpi xmlns:a14="http://schemas.microsoft.com/office/drawing/2010/main" val="0"/>
-              </a:ext>
-            </a:extLst>
-          </a:blip>
-          <a:srcRect/>
-          <a:stretch>
-            <a:fillRect/>
-          </a:stretch>
-        </p:blipFill>
-        <p:spPr bwMode="auto">
-          <a:xfrm>
-            <a:off x="251519" y="2132856"/>
-            <a:ext cx="8598371" cy="3734016"/>
-          </a:xfrm>
-          <a:prstGeom prst="rect">
-            <a:avLst/>
-          </a:prstGeom>
-          <a:noFill/>
-          <a:ln>
-            <a:noFill/>
-          </a:ln>
-          <a:effectLst/>
-          <a:extLst>
-            <a:ext uri="{909E8E84-426E-40DD-AFC4-6F175D3DCCD1}">
-              <a14:hiddenFill xmlns:a14="http://schemas.microsoft.com/office/drawing/2010/main">
-                <a:solidFill>
-                  <a:schemeClr val="accent1"/>
-                </a:solidFill>
-              </a14:hiddenFill>
-            </a:ext>
-            <a:ext uri="{91240B29-F687-4F45-9708-019B960494DF}">
-              <a14:hiddenLine xmlns:a14="http://schemas.microsoft.com/office/drawing/2010/main" w="9525">
-                <a:solidFill>
-                  <a:schemeClr val="tx1"/>
-                </a:solidFill>
-                <a:miter lim="800000"/>
-                <a:headEnd/>
-                <a:tailEnd/>
-              </a14:hiddenLine>
-            </a:ext>
-            <a:ext uri="{AF507438-7753-43E0-B8FC-AC1667EBCBE1}">
-              <a14:hiddenEffects xmlns:a14="http://schemas.microsoft.com/office/drawing/2010/main">
-                <a:effectLst>
-                  <a:outerShdw dist="35921" dir="2700000" algn="ctr" rotWithShape="0">
-                    <a:schemeClr val="bg2"/>
-                  </a:outerShdw>
-                </a:effectLst>
-              </a14:hiddenEffects>
-            </a:ext>
-          </a:extLst>
-        </p:spPr>
-      </p:pic>
-    </p:spTree>
-    <p:extLst>
-      <p:ext uri="{BB962C8B-B14F-4D97-AF65-F5344CB8AC3E}">
-        <p14:creationId xmlns:p14="http://schemas.microsoft.com/office/powerpoint/2010/main" val="4261227779"/>
-      </p:ext>
-    </p:extLst>
-  </p:cSld>
-  <p:clrMapOvr>
-    <a:masterClrMapping/>
-  </p:clrMapOvr>
-  <p:timing>
-    <p:tnLst>
-      <p:par>
-        <p:cTn id="1" dur="indefinite" restart="never" nodeType="tmRoot"/>
-      </p:par>
-    </p:tnLst>
-  </p:timing>
-</p:sld>
-</file>
-
-<file path=ppt/slides/slide9.xml><?xml version="1.0" encoding="utf-8"?>
-<p:sld xmlns:a="http://schemas.openxmlformats.org/drawingml/2006/main" xmlns:r="http://schemas.openxmlformats.org/officeDocument/2006/relationships" xmlns:p="http://schemas.openxmlformats.org/presentationml/2006/main">
-  <p:cSld>
-    <p:spTree>
-      <p:nvGrpSpPr>
-        <p:cNvPr id="1" name=""/>
-        <p:cNvGrpSpPr/>
-        <p:nvPr/>
-      </p:nvGrpSpPr>
-      <p:grpSpPr>
-        <a:xfrm>
-          <a:off x="0" y="0"/>
-          <a:ext cx="0" cy="0"/>
-          <a:chOff x="0" y="0"/>
-          <a:chExt cx="0" cy="0"/>
-        </a:xfrm>
-      </p:grpSpPr>
-      <p:sp>
-        <p:nvSpPr>
-          <p:cNvPr id="4" name="標題 1"/>
-          <p:cNvSpPr txBox="1">
-            <a:spLocks/>
-          </p:cNvSpPr>
-          <p:nvPr/>
-        </p:nvSpPr>
-        <p:spPr>
-          <a:xfrm>
-            <a:off x="914211" y="764704"/>
-            <a:ext cx="7543800" cy="720080"/>
-          </a:xfrm>
-          <a:prstGeom prst="rect">
-            <a:avLst/>
-          </a:prstGeom>
-        </p:spPr>
-        <p:txBody>
-          <a:bodyPr vert="horz" lIns="91440" tIns="45720" rIns="91440" bIns="45720" rtlCol="0" anchor="b">
-            <a:noAutofit/>
-          </a:bodyPr>
-          <a:lstStyle>
-            <a:lvl1pPr algn="l" defTabSz="914400" rtl="0" eaLnBrk="1" latinLnBrk="0" hangingPunct="1">
-              <a:spcBef>
-                <a:spcPct val="0"/>
-              </a:spcBef>
-              <a:buNone/>
-              <a:defRPr sz="6000" kern="1200">
-                <a:solidFill>
-                  <a:schemeClr val="tx1"/>
-                </a:solidFill>
-                <a:effectLst>
-                  <a:outerShdw blurRad="38100" dist="38100" dir="2700000" algn="tl">
-                    <a:srgbClr val="000000">
-                      <a:alpha val="43137"/>
-                    </a:srgbClr>
-                  </a:outerShdw>
-                </a:effectLst>
-                <a:latin typeface="+mj-lt"/>
-                <a:ea typeface="+mj-ea"/>
-                <a:cs typeface="+mj-cs"/>
-              </a:defRPr>
-            </a:lvl1pPr>
-            <a:lvl2pPr eaLnBrk="1" hangingPunct="1">
-              <a:defRPr>
-                <a:solidFill>
-                  <a:schemeClr val="tx2"/>
-                </a:solidFill>
-              </a:defRPr>
-            </a:lvl2pPr>
-            <a:lvl3pPr eaLnBrk="1" hangingPunct="1">
-              <a:defRPr>
-                <a:solidFill>
-                  <a:schemeClr val="tx2"/>
-                </a:solidFill>
-              </a:defRPr>
-            </a:lvl3pPr>
-            <a:lvl4pPr eaLnBrk="1" hangingPunct="1">
-              <a:defRPr>
-                <a:solidFill>
-                  <a:schemeClr val="tx2"/>
-                </a:solidFill>
-              </a:defRPr>
-            </a:lvl4pPr>
-            <a:lvl5pPr eaLnBrk="1" hangingPunct="1">
-              <a:defRPr>
-                <a:solidFill>
-                  <a:schemeClr val="tx2"/>
-                </a:solidFill>
-              </a:defRPr>
-            </a:lvl5pPr>
-            <a:lvl6pPr eaLnBrk="1" hangingPunct="1">
-              <a:defRPr>
-                <a:solidFill>
-                  <a:schemeClr val="tx2"/>
-                </a:solidFill>
-              </a:defRPr>
-            </a:lvl6pPr>
-            <a:lvl7pPr eaLnBrk="1" hangingPunct="1">
-              <a:defRPr>
-                <a:solidFill>
-                  <a:schemeClr val="tx2"/>
-                </a:solidFill>
-              </a:defRPr>
-            </a:lvl7pPr>
-            <a:lvl8pPr eaLnBrk="1" hangingPunct="1">
-              <a:defRPr>
-                <a:solidFill>
-                  <a:schemeClr val="tx2"/>
-                </a:solidFill>
-              </a:defRPr>
-            </a:lvl8pPr>
-            <a:lvl9pPr eaLnBrk="1" hangingPunct="1">
-              <a:defRPr>
-                <a:solidFill>
-                  <a:schemeClr val="tx2"/>
-                </a:solidFill>
-              </a:defRPr>
-            </a:lvl9pPr>
-          </a:lstStyle>
-          <a:p>
-            <a:r>
-              <a:rPr lang="zh-TW" altLang="en-US" sz="4000" b="1" dirty="0" smtClean="0"/>
-              <a:t>首頁 </a:t>
-            </a:r>
-            <a:r>
-              <a:rPr lang="en-US" altLang="zh-TW" sz="4000" b="1" dirty="0"/>
-              <a:t>/</a:t>
-            </a:r>
-            <a:r>
-              <a:rPr lang="zh-TW" altLang="en-US" sz="4000" b="1" dirty="0"/>
-              <a:t> 系統帳號</a:t>
-            </a:r>
-            <a:r>
-              <a:rPr lang="zh-TW" altLang="en-US" sz="4000" b="1" dirty="0" smtClean="0"/>
-              <a:t>管理</a:t>
-            </a:r>
-            <a:endParaRPr lang="zh-TW" altLang="en-US" sz="4000" b="1" dirty="0"/>
-          </a:p>
-        </p:txBody>
-      </p:sp>
-      <p:pic>
-        <p:nvPicPr>
-          <p:cNvPr id="6146" name="Picture 2"/>
-          <p:cNvPicPr>
-            <a:picLocks noChangeAspect="1" noChangeArrowheads="1"/>
-          </p:cNvPicPr>
-          <p:nvPr/>
-        </p:nvPicPr>
-        <p:blipFill>
-          <a:blip r:embed="rId2">
-            <a:extLst>
-              <a:ext uri="{28A0092B-C50C-407E-A947-70E740481C1C}">
-                <a14:useLocalDpi xmlns:a14="http://schemas.microsoft.com/office/drawing/2010/main" val="0"/>
-              </a:ext>
-            </a:extLst>
-          </a:blip>
-          <a:srcRect/>
-          <a:stretch>
-            <a:fillRect/>
-          </a:stretch>
-        </p:blipFill>
-        <p:spPr bwMode="auto">
-          <a:xfrm>
-            <a:off x="209325" y="2276872"/>
-            <a:ext cx="8758833" cy="3826520"/>
-          </a:xfrm>
-          <a:prstGeom prst="rect">
-            <a:avLst/>
-          </a:prstGeom>
-          <a:noFill/>
-          <a:ln>
-            <a:noFill/>
-          </a:ln>
-          <a:effectLst/>
-          <a:extLst>
-            <a:ext uri="{909E8E84-426E-40DD-AFC4-6F175D3DCCD1}">
-              <a14:hiddenFill xmlns:a14="http://schemas.microsoft.com/office/drawing/2010/main">
-                <a:solidFill>
-                  <a:schemeClr val="accent1"/>
-                </a:solidFill>
-              </a14:hiddenFill>
-            </a:ext>
-            <a:ext uri="{91240B29-F687-4F45-9708-019B960494DF}">
-              <a14:hiddenLine xmlns:a14="http://schemas.microsoft.com/office/drawing/2010/main" w="9525">
-                <a:solidFill>
-                  <a:schemeClr val="tx1"/>
-                </a:solidFill>
-                <a:miter lim="800000"/>
-                <a:headEnd/>
-                <a:tailEnd/>
-              </a14:hiddenLine>
-            </a:ext>
-            <a:ext uri="{AF507438-7753-43E0-B8FC-AC1667EBCBE1}">
-              <a14:hiddenEffects xmlns:a14="http://schemas.microsoft.com/office/drawing/2010/main">
-                <a:effectLst>
-                  <a:outerShdw dist="35921" dir="2700000" algn="ctr" rotWithShape="0">
-                    <a:schemeClr val="bg2"/>
-                  </a:outerShdw>
-                </a:effectLst>
-              </a14:hiddenEffects>
-            </a:ext>
-          </a:extLst>
-        </p:spPr>
-      </p:pic>
-    </p:spTree>
-    <p:extLst>
-      <p:ext uri="{BB962C8B-B14F-4D97-AF65-F5344CB8AC3E}">
-        <p14:creationId xmlns:p14="http://schemas.microsoft.com/office/powerpoint/2010/main" val="969067509"/>
       </p:ext>
     </p:extLst>
   </p:cSld>

</xml_diff>